<commit_message>
Fridget logo clean added
</commit_message>
<xml_diff>
--- a/documentation/Pflichtenheft/Pflichtenheft_Präsentation.pptx
+++ b/documentation/Pflichtenheft/Pflichtenheft_Präsentation.pptx
@@ -250,7 +250,8 @@
           <a:p>
             <a:fld id="{EB99765B-6265-4230-895B-55A7E0C311D7}" type="datetimeFigureOut">
               <a:rPr lang="de-DE" smtClean="0"/>
-              <a:t>28.05.2018</a:t>
+              <a:pPr/>
+              <a:t>29.05.2018</a:t>
             </a:fld>
             <a:endParaRPr lang="de-DE"/>
           </a:p>
@@ -996,6 +997,7 @@
           <a:p>
             <a:fld id="{0B7BCCC9-5696-40DE-A8E0-B36D3734B33F}" type="slidenum">
               <a:rPr lang="de-DE" smtClean="0"/>
+              <a:pPr/>
               <a:t>‹Nr.›</a:t>
             </a:fld>
             <a:endParaRPr lang="de-DE"/>
@@ -1119,7 +1121,8 @@
           <a:p>
             <a:fld id="{EB99765B-6265-4230-895B-55A7E0C311D7}" type="datetimeFigureOut">
               <a:rPr lang="de-DE" smtClean="0"/>
-              <a:t>28.05.2018</a:t>
+              <a:pPr/>
+              <a:t>29.05.2018</a:t>
             </a:fld>
             <a:endParaRPr lang="de-DE"/>
           </a:p>
@@ -1161,6 +1164,7 @@
           <a:p>
             <a:fld id="{0B7BCCC9-5696-40DE-A8E0-B36D3734B33F}" type="slidenum">
               <a:rPr lang="de-DE" smtClean="0"/>
+              <a:pPr/>
               <a:t>‹Nr.›</a:t>
             </a:fld>
             <a:endParaRPr lang="de-DE"/>
@@ -1294,7 +1298,8 @@
           <a:p>
             <a:fld id="{EB99765B-6265-4230-895B-55A7E0C311D7}" type="datetimeFigureOut">
               <a:rPr lang="de-DE" smtClean="0"/>
-              <a:t>28.05.2018</a:t>
+              <a:pPr/>
+              <a:t>29.05.2018</a:t>
             </a:fld>
             <a:endParaRPr lang="de-DE"/>
           </a:p>
@@ -1336,6 +1341,7 @@
           <a:p>
             <a:fld id="{0B7BCCC9-5696-40DE-A8E0-B36D3734B33F}" type="slidenum">
               <a:rPr lang="de-DE" smtClean="0"/>
+              <a:pPr/>
               <a:t>‹Nr.›</a:t>
             </a:fld>
             <a:endParaRPr lang="de-DE"/>
@@ -1464,7 +1470,8 @@
           <a:p>
             <a:fld id="{EB99765B-6265-4230-895B-55A7E0C311D7}" type="datetimeFigureOut">
               <a:rPr lang="de-DE" smtClean="0"/>
-              <a:t>28.05.2018</a:t>
+              <a:pPr/>
+              <a:t>29.05.2018</a:t>
             </a:fld>
             <a:endParaRPr lang="de-DE"/>
           </a:p>
@@ -1487,6 +1494,7 @@
           <a:p>
             <a:fld id="{0B7BCCC9-5696-40DE-A8E0-B36D3734B33F}" type="slidenum">
               <a:rPr lang="de-DE" smtClean="0"/>
+              <a:pPr/>
               <a:t>‹Nr.›</a:t>
             </a:fld>
             <a:endParaRPr lang="de-DE"/>
@@ -1674,7 +1682,8 @@
           <a:p>
             <a:fld id="{EB99765B-6265-4230-895B-55A7E0C311D7}" type="datetimeFigureOut">
               <a:rPr lang="de-DE" smtClean="0"/>
-              <a:t>28.05.2018</a:t>
+              <a:pPr/>
+              <a:t>29.05.2018</a:t>
             </a:fld>
             <a:endParaRPr lang="de-DE"/>
           </a:p>
@@ -2417,6 +2426,7 @@
           <a:p>
             <a:fld id="{0B7BCCC9-5696-40DE-A8E0-B36D3734B33F}" type="slidenum">
               <a:rPr lang="de-DE" smtClean="0"/>
+              <a:pPr/>
               <a:t>‹Nr.›</a:t>
             </a:fld>
             <a:endParaRPr lang="de-DE"/>
@@ -2488,7 +2498,8 @@
           <a:p>
             <a:fld id="{EB99765B-6265-4230-895B-55A7E0C311D7}" type="datetimeFigureOut">
               <a:rPr lang="de-DE" smtClean="0"/>
-              <a:t>28.05.2018</a:t>
+              <a:pPr/>
+              <a:t>29.05.2018</a:t>
             </a:fld>
             <a:endParaRPr lang="de-DE"/>
           </a:p>
@@ -2530,6 +2541,7 @@
           <a:p>
             <a:fld id="{0B7BCCC9-5696-40DE-A8E0-B36D3734B33F}" type="slidenum">
               <a:rPr lang="de-DE" smtClean="0"/>
+              <a:pPr/>
               <a:t>‹Nr.›</a:t>
             </a:fld>
             <a:endParaRPr lang="de-DE"/>
@@ -2724,7 +2736,8 @@
           <a:p>
             <a:fld id="{EB99765B-6265-4230-895B-55A7E0C311D7}" type="datetimeFigureOut">
               <a:rPr lang="de-DE" smtClean="0"/>
-              <a:t>28.05.2018</a:t>
+              <a:pPr/>
+              <a:t>29.05.2018</a:t>
             </a:fld>
             <a:endParaRPr lang="de-DE"/>
           </a:p>
@@ -2766,6 +2779,7 @@
           <a:p>
             <a:fld id="{0B7BCCC9-5696-40DE-A8E0-B36D3734B33F}" type="slidenum">
               <a:rPr lang="de-DE" smtClean="0"/>
+              <a:pPr/>
               <a:t>‹Nr.›</a:t>
             </a:fld>
             <a:endParaRPr lang="de-DE"/>
@@ -3047,7 +3061,8 @@
           <a:p>
             <a:fld id="{EB99765B-6265-4230-895B-55A7E0C311D7}" type="datetimeFigureOut">
               <a:rPr lang="de-DE" smtClean="0"/>
-              <a:t>28.05.2018</a:t>
+              <a:pPr/>
+              <a:t>29.05.2018</a:t>
             </a:fld>
             <a:endParaRPr lang="de-DE"/>
           </a:p>
@@ -3070,6 +3085,7 @@
           <a:p>
             <a:fld id="{0B7BCCC9-5696-40DE-A8E0-B36D3734B33F}" type="slidenum">
               <a:rPr lang="de-DE" smtClean="0"/>
+              <a:pPr/>
               <a:t>‹Nr.›</a:t>
             </a:fld>
             <a:endParaRPr lang="de-DE"/>
@@ -3137,7 +3153,8 @@
           <a:p>
             <a:fld id="{EB99765B-6265-4230-895B-55A7E0C311D7}" type="datetimeFigureOut">
               <a:rPr lang="de-DE" smtClean="0"/>
-              <a:t>28.05.2018</a:t>
+              <a:pPr/>
+              <a:t>29.05.2018</a:t>
             </a:fld>
             <a:endParaRPr lang="de-DE"/>
           </a:p>
@@ -3179,6 +3196,7 @@
           <a:p>
             <a:fld id="{0B7BCCC9-5696-40DE-A8E0-B36D3734B33F}" type="slidenum">
               <a:rPr lang="de-DE" smtClean="0"/>
+              <a:pPr/>
               <a:t>‹Nr.›</a:t>
             </a:fld>
             <a:endParaRPr lang="de-DE"/>
@@ -3654,7 +3672,8 @@
           <a:p>
             <a:fld id="{EB99765B-6265-4230-895B-55A7E0C311D7}" type="datetimeFigureOut">
               <a:rPr lang="de-DE" smtClean="0"/>
-              <a:t>28.05.2018</a:t>
+              <a:pPr/>
+              <a:t>29.05.2018</a:t>
             </a:fld>
             <a:endParaRPr lang="de-DE"/>
           </a:p>
@@ -3677,6 +3696,7 @@
           <a:p>
             <a:fld id="{0B7BCCC9-5696-40DE-A8E0-B36D3734B33F}" type="slidenum">
               <a:rPr lang="de-DE" smtClean="0"/>
+              <a:pPr/>
               <a:t>‹Nr.›</a:t>
             </a:fld>
             <a:endParaRPr lang="de-DE"/>
@@ -4165,7 +4185,8 @@
           <a:p>
             <a:fld id="{EB99765B-6265-4230-895B-55A7E0C311D7}" type="datetimeFigureOut">
               <a:rPr lang="de-DE" smtClean="0"/>
-              <a:t>28.05.2018</a:t>
+              <a:pPr/>
+              <a:t>29.05.2018</a:t>
             </a:fld>
             <a:endParaRPr lang="de-DE"/>
           </a:p>
@@ -4188,6 +4209,7 @@
           <a:p>
             <a:fld id="{0B7BCCC9-5696-40DE-A8E0-B36D3734B33F}" type="slidenum">
               <a:rPr lang="de-DE" smtClean="0"/>
+              <a:pPr/>
               <a:t>‹Nr.›</a:t>
             </a:fld>
             <a:endParaRPr lang="de-DE"/>
@@ -4410,7 +4432,8 @@
           <a:p>
             <a:fld id="{EB99765B-6265-4230-895B-55A7E0C311D7}" type="datetimeFigureOut">
               <a:rPr lang="de-DE" smtClean="0"/>
-              <a:t>28.05.2018</a:t>
+              <a:pPr/>
+              <a:t>29.05.2018</a:t>
             </a:fld>
             <a:endParaRPr lang="de-DE"/>
           </a:p>
@@ -4686,6 +4709,7 @@
           <a:p>
             <a:fld id="{0B7BCCC9-5696-40DE-A8E0-B36D3734B33F}" type="slidenum">
               <a:rPr lang="de-DE" smtClean="0"/>
+              <a:pPr/>
               <a:t>‹Nr.›</a:t>
             </a:fld>
             <a:endParaRPr lang="de-DE"/>
@@ -5143,35 +5167,26 @@
       </p:sp>
       <p:pic>
         <p:nvPicPr>
-          <p:cNvPr id="1026" name="Picture 2"/>
+          <p:cNvPr id="5" name="Grafik 4" descr="fridget_logotext.PNG"/>
           <p:cNvPicPr>
-            <a:picLocks noChangeAspect="1" noChangeArrowheads="1"/>
+            <a:picLocks noChangeAspect="1"/>
           </p:cNvPicPr>
           <p:nvPr/>
         </p:nvPicPr>
         <p:blipFill>
           <a:blip r:embed="rId3"/>
-          <a:srcRect/>
           <a:stretch>
             <a:fillRect/>
           </a:stretch>
         </p:blipFill>
-        <p:spPr bwMode="auto">
-          <a:xfrm>
-            <a:off x="4357686" y="1071546"/>
-            <a:ext cx="3452447" cy="785818"/>
+        <p:spPr>
+          <a:xfrm>
+            <a:off x="4279752" y="1357298"/>
+            <a:ext cx="3221206" cy="857256"/>
           </a:xfrm>
           <a:prstGeom prst="rect">
             <a:avLst/>
           </a:prstGeom>
-          <a:noFill/>
-          <a:ln w="9525">
-            <a:noFill/>
-            <a:miter lim="800000"/>
-            <a:headEnd/>
-            <a:tailEnd/>
-          </a:ln>
-          <a:effectLst/>
         </p:spPr>
       </p:pic>
     </p:spTree>
@@ -6320,23 +6335,7 @@
             <a:pPr marL="447675" indent="-447675" fontAlgn="base"/>
             <a:r>
               <a:rPr lang="de-DE" sz="2800" dirty="0" smtClean="0"/>
-              <a:t>Man </a:t>
-            </a:r>
-            <a:r>
-              <a:rPr lang="de-DE" sz="2800" dirty="0" smtClean="0"/>
-              <a:t>kann nur </a:t>
-            </a:r>
-            <a:r>
-              <a:rPr lang="de-DE" sz="2800" dirty="0" smtClean="0"/>
-              <a:t>Mitglied </a:t>
-            </a:r>
-            <a:r>
-              <a:rPr lang="de-DE" sz="2800" dirty="0" smtClean="0"/>
-              <a:t>einer WG sein</a:t>
-            </a:r>
-            <a:r>
-              <a:rPr lang="de-DE" sz="2800" dirty="0" smtClean="0"/>
-              <a:t>.</a:t>
+              <a:t>Man kann nur Mitglied einer WG sein.</a:t>
             </a:r>
           </a:p>
           <a:p>
@@ -6349,11 +6348,7 @@
             <a:pPr marL="447675" indent="-447675" fontAlgn="base"/>
             <a:r>
               <a:rPr lang="de-DE" sz="2800" dirty="0" smtClean="0"/>
-              <a:t>Eine WG kann nicht mehr als 15 Mitglieder haben</a:t>
-            </a:r>
-            <a:r>
-              <a:rPr lang="de-DE" sz="2800" dirty="0" smtClean="0"/>
-              <a:t>.</a:t>
+              <a:t>Eine WG kann nicht mehr als 15 Mitglieder haben.</a:t>
             </a:r>
           </a:p>
           <a:p>
@@ -6370,11 +6365,7 @@
             </a:r>
             <a:r>
               <a:rPr lang="de-DE" sz="2800" dirty="0" smtClean="0"/>
-              <a:t> können nicht bearbeitet werden</a:t>
-            </a:r>
-            <a:r>
-              <a:rPr lang="de-DE" sz="2800" dirty="0" smtClean="0"/>
-              <a:t>.</a:t>
+              <a:t> können nicht bearbeitet werden.</a:t>
             </a:r>
           </a:p>
           <a:p>
@@ -6395,11 +6386,7 @@
             </a:r>
             <a:r>
               <a:rPr lang="de-DE" sz="2800" dirty="0" smtClean="0"/>
-              <a:t>pro Pinnwand erstellt werden</a:t>
-            </a:r>
-            <a:r>
-              <a:rPr lang="de-DE" sz="2800" dirty="0" smtClean="0"/>
-              <a:t>.</a:t>
+              <a:t>pro Pinnwand erstellt werden.</a:t>
             </a:r>
           </a:p>
           <a:p>
@@ -6412,15 +6399,7 @@
             <a:pPr marL="447675" indent="-447675" fontAlgn="base"/>
             <a:r>
               <a:rPr lang="de-DE" sz="2800" dirty="0" smtClean="0"/>
-              <a:t>Jedes Mitglied kann nur </a:t>
-            </a:r>
-            <a:r>
-              <a:rPr lang="de-DE" sz="2800" dirty="0" smtClean="0"/>
-              <a:t>einen </a:t>
-            </a:r>
-            <a:r>
-              <a:rPr lang="de-DE" sz="2800" dirty="0" smtClean="0"/>
-              <a:t>Kommentar pro Note schreiben.</a:t>
+              <a:t>Jedes Mitglied kann nur einen Kommentar pro Note schreiben.</a:t>
             </a:r>
           </a:p>
           <a:p>
@@ -6572,6 +6551,30 @@
           <a:xfrm>
             <a:off x="928662" y="2643182"/>
             <a:ext cx="2400302" cy="4000504"/>
+          </a:xfrm>
+          <a:prstGeom prst="rect">
+            <a:avLst/>
+          </a:prstGeom>
+        </p:spPr>
+      </p:pic>
+      <p:pic>
+        <p:nvPicPr>
+          <p:cNvPr id="8" name="Grafik 7" descr="fridget_logotext.PNG"/>
+          <p:cNvPicPr>
+            <a:picLocks noChangeAspect="1"/>
+          </p:cNvPicPr>
+          <p:nvPr/>
+        </p:nvPicPr>
+        <p:blipFill>
+          <a:blip r:embed="rId3"/>
+          <a:stretch>
+            <a:fillRect/>
+          </a:stretch>
+        </p:blipFill>
+        <p:spPr>
+          <a:xfrm>
+            <a:off x="4000496" y="4357694"/>
+            <a:ext cx="3221206" cy="857256"/>
           </a:xfrm>
           <a:prstGeom prst="rect">
             <a:avLst/>

</xml_diff>

<commit_message>
Minor table size adjustment
</commit_message>
<xml_diff>
--- a/documentation/Pflichtenheft/Pflichtenheft_Präsentation.pptx
+++ b/documentation/Pflichtenheft/Pflichtenheft_Präsentation.pptx
@@ -5960,7 +5960,7 @@
         </p:nvGraphicFramePr>
         <p:xfrm>
           <a:off x="5786438" y="1285862"/>
-          <a:ext cx="2923985" cy="3888000"/>
+          <a:ext cx="2592000" cy="3888000"/>
         </p:xfrm>
         <a:graphic>
           <a:graphicData uri="http://schemas.openxmlformats.org/drawingml/2006/table">
@@ -5969,7 +5969,7 @@
                 <a:tableStyleId>{5C22544A-7EE6-4342-B048-85BDC9FD1C3A}</a:tableStyleId>
               </a:tblPr>
               <a:tblGrid>
-                <a:gridCol w="1951985"/>
+                <a:gridCol w="1620000"/>
                 <a:gridCol w="486000"/>
                 <a:gridCol w="486000"/>
               </a:tblGrid>
@@ -5989,7 +5989,7 @@
                     <a:bodyPr/>
                     <a:lstStyle/>
                     <a:p>
-                      <a:pPr algn="ctr">
+                      <a:pPr marL="0" indent="0" algn="ctr">
                         <a:tabLst>
                           <a:tab pos="180975" algn="l"/>
                         </a:tabLst>
@@ -6026,10 +6026,10 @@
                     <a:lstStyle/>
                     <a:p>
                       <a:r>
-                        <a:rPr lang="de-DE" dirty="0" smtClean="0"/>
+                        <a:rPr lang="de-DE" sz="1600" dirty="0" smtClean="0"/>
                         <a:t>Bearbeitbar</a:t>
                       </a:r>
-                      <a:endParaRPr lang="de-DE" dirty="0"/>
+                      <a:endParaRPr lang="de-DE" sz="1600" dirty="0"/>
                     </a:p>
                   </a:txBody>
                   <a:tcPr anchor="ctr"/>
@@ -6041,10 +6041,10 @@
                     <a:p>
                       <a:pPr algn="ctr"/>
                       <a:r>
-                        <a:rPr lang="de-DE" dirty="0" smtClean="0"/>
+                        <a:rPr lang="de-DE" sz="1600" dirty="0" smtClean="0"/>
                         <a:t>N</a:t>
                       </a:r>
-                      <a:endParaRPr lang="de-DE" dirty="0"/>
+                      <a:endParaRPr lang="de-DE" sz="1600" dirty="0"/>
                     </a:p>
                   </a:txBody>
                   <a:tcPr anchor="ctr"/>
@@ -6056,10 +6056,10 @@
                     <a:p>
                       <a:pPr algn="ctr"/>
                       <a:r>
-                        <a:rPr lang="de-DE" dirty="0" smtClean="0"/>
+                        <a:rPr lang="de-DE" sz="1600" dirty="0" smtClean="0"/>
                         <a:t>J</a:t>
                       </a:r>
-                      <a:endParaRPr lang="de-DE" dirty="0"/>
+                      <a:endParaRPr lang="de-DE" sz="1600" dirty="0"/>
                     </a:p>
                   </a:txBody>
                   <a:tcPr anchor="ctr"/>
@@ -6072,10 +6072,10 @@
                     <a:lstStyle/>
                     <a:p>
                       <a:r>
-                        <a:rPr lang="de-DE" dirty="0" smtClean="0"/>
+                        <a:rPr lang="de-DE" sz="1600" dirty="0" smtClean="0"/>
                         <a:t>Löschbar</a:t>
                       </a:r>
-                      <a:endParaRPr lang="de-DE" dirty="0"/>
+                      <a:endParaRPr lang="de-DE" sz="1600" dirty="0"/>
                     </a:p>
                   </a:txBody>
                   <a:tcPr anchor="ctr"/>
@@ -6087,10 +6087,10 @@
                     <a:p>
                       <a:pPr algn="ctr"/>
                       <a:r>
-                        <a:rPr lang="de-DE" dirty="0" smtClean="0"/>
+                        <a:rPr lang="de-DE" sz="1600" dirty="0" smtClean="0"/>
                         <a:t>J</a:t>
                       </a:r>
-                      <a:endParaRPr lang="de-DE" dirty="0"/>
+                      <a:endParaRPr lang="de-DE" sz="1600" dirty="0"/>
                     </a:p>
                   </a:txBody>
                   <a:tcPr anchor="ctr"/>
@@ -6102,10 +6102,10 @@
                     <a:p>
                       <a:pPr algn="ctr"/>
                       <a:r>
-                        <a:rPr lang="de-DE" dirty="0" smtClean="0"/>
+                        <a:rPr lang="de-DE" sz="1600" dirty="0" smtClean="0"/>
                         <a:t>N</a:t>
                       </a:r>
-                      <a:endParaRPr lang="de-DE" dirty="0"/>
+                      <a:endParaRPr lang="de-DE" sz="1600" dirty="0"/>
                     </a:p>
                   </a:txBody>
                   <a:tcPr anchor="ctr"/>
@@ -6118,10 +6118,10 @@
                     <a:lstStyle/>
                     <a:p>
                       <a:r>
-                        <a:rPr lang="de-DE" dirty="0" smtClean="0"/>
+                        <a:rPr lang="de-DE" sz="1600" dirty="0" smtClean="0"/>
                         <a:t>Kommentieren</a:t>
                       </a:r>
-                      <a:endParaRPr lang="de-DE" dirty="0"/>
+                      <a:endParaRPr lang="de-DE" sz="1600" dirty="0"/>
                     </a:p>
                   </a:txBody>
                   <a:tcPr anchor="ctr"/>
@@ -6133,10 +6133,10 @@
                     <a:p>
                       <a:pPr algn="ctr"/>
                       <a:r>
-                        <a:rPr lang="de-DE" dirty="0" smtClean="0"/>
+                        <a:rPr lang="de-DE" sz="1600" dirty="0" smtClean="0"/>
                         <a:t>J</a:t>
                       </a:r>
-                      <a:endParaRPr lang="de-DE" dirty="0"/>
+                      <a:endParaRPr lang="de-DE" sz="1600" dirty="0"/>
                     </a:p>
                   </a:txBody>
                   <a:tcPr anchor="ctr"/>
@@ -6148,10 +6148,10 @@
                     <a:p>
                       <a:pPr algn="ctr"/>
                       <a:r>
-                        <a:rPr lang="de-DE" dirty="0" smtClean="0"/>
+                        <a:rPr lang="de-DE" sz="1600" dirty="0" smtClean="0"/>
                         <a:t>N</a:t>
                       </a:r>
-                      <a:endParaRPr lang="de-DE" dirty="0"/>
+                      <a:endParaRPr lang="de-DE" sz="1600" dirty="0"/>
                     </a:p>
                   </a:txBody>
                   <a:tcPr anchor="ctr"/>
@@ -6164,10 +6164,10 @@
                     <a:lstStyle/>
                     <a:p>
                       <a:r>
-                        <a:rPr lang="de-DE" dirty="0" smtClean="0"/>
+                        <a:rPr lang="de-DE" sz="1600" dirty="0" smtClean="0"/>
                         <a:t>Lesebestätigung</a:t>
                       </a:r>
-                      <a:endParaRPr lang="de-DE" dirty="0"/>
+                      <a:endParaRPr lang="de-DE" sz="1600" dirty="0"/>
                     </a:p>
                   </a:txBody>
                   <a:tcPr anchor="ctr"/>
@@ -6179,10 +6179,10 @@
                     <a:p>
                       <a:pPr algn="ctr"/>
                       <a:r>
-                        <a:rPr lang="de-DE" dirty="0" smtClean="0"/>
+                        <a:rPr lang="de-DE" sz="1600" dirty="0" smtClean="0"/>
                         <a:t>J</a:t>
                       </a:r>
-                      <a:endParaRPr lang="de-DE" dirty="0"/>
+                      <a:endParaRPr lang="de-DE" sz="1600" dirty="0"/>
                     </a:p>
                   </a:txBody>
                   <a:tcPr anchor="ctr"/>
@@ -6194,10 +6194,10 @@
                     <a:p>
                       <a:pPr algn="ctr"/>
                       <a:r>
-                        <a:rPr lang="de-DE" dirty="0" smtClean="0"/>
+                        <a:rPr lang="de-DE" sz="1600" dirty="0" smtClean="0"/>
                         <a:t>N</a:t>
                       </a:r>
-                      <a:endParaRPr lang="de-DE" dirty="0"/>
+                      <a:endParaRPr lang="de-DE" sz="1600" dirty="0"/>
                     </a:p>
                   </a:txBody>
                   <a:tcPr anchor="ctr"/>
@@ -6210,10 +6210,10 @@
                     <a:lstStyle/>
                     <a:p>
                       <a:r>
-                        <a:rPr lang="de-DE" dirty="0" err="1" smtClean="0"/>
+                        <a:rPr lang="de-DE" sz="1600" dirty="0" err="1" smtClean="0"/>
                         <a:t>Taggen</a:t>
                       </a:r>
-                      <a:endParaRPr lang="de-DE" dirty="0"/>
+                      <a:endParaRPr lang="de-DE" sz="1600" dirty="0"/>
                     </a:p>
                   </a:txBody>
                   <a:tcPr anchor="ctr"/>
@@ -6225,10 +6225,10 @@
                     <a:p>
                       <a:pPr algn="ctr"/>
                       <a:r>
-                        <a:rPr lang="de-DE" dirty="0" smtClean="0"/>
+                        <a:rPr lang="de-DE" sz="1600" dirty="0" smtClean="0"/>
                         <a:t>J</a:t>
                       </a:r>
-                      <a:endParaRPr lang="de-DE" dirty="0"/>
+                      <a:endParaRPr lang="de-DE" sz="1600" dirty="0"/>
                     </a:p>
                   </a:txBody>
                   <a:tcPr anchor="ctr"/>
@@ -6240,10 +6240,10 @@
                     <a:p>
                       <a:pPr algn="ctr"/>
                       <a:r>
-                        <a:rPr lang="de-DE" dirty="0" smtClean="0"/>
+                        <a:rPr lang="de-DE" sz="1600" dirty="0" smtClean="0"/>
                         <a:t>N</a:t>
                       </a:r>
-                      <a:endParaRPr lang="de-DE" dirty="0"/>
+                      <a:endParaRPr lang="de-DE" sz="1600" dirty="0"/>
                     </a:p>
                   </a:txBody>
                   <a:tcPr anchor="ctr"/>

</xml_diff>